<commit_message>
Update Hide Info's DG (#132)
* Update Hide Info's DG

* Make small changes
</commit_message>
<xml_diff>
--- a/docs/diagrams/HideInfoSequenceDiagrams.pptx
+++ b/docs/diagrams/HideInfoSequenceDiagrams.pptx
@@ -208,7 +208,7 @@
           <a:p>
             <a:fld id="{F5CC4B3F-88C1-4FFA-B1B6-F41C21DC6924}" type="datetimeFigureOut">
               <a:rPr lang="en-US" smtClean="0"/>
-              <a:t>10/18/18</a:t>
+              <a:t>10/25/18</a:t>
             </a:fld>
             <a:endParaRPr lang="en-US"/>
           </a:p>
@@ -654,7 +654,7 @@
           <a:p>
             <a:fld id="{78C97017-6FC3-485B-9764-EAC9E56C1D49}" type="datetimeFigureOut">
               <a:rPr lang="en-US" smtClean="0"/>
-              <a:t>10/18/18</a:t>
+              <a:t>10/25/18</a:t>
             </a:fld>
             <a:endParaRPr lang="en-US"/>
           </a:p>
@@ -822,7 +822,7 @@
           <a:p>
             <a:fld id="{78C97017-6FC3-485B-9764-EAC9E56C1D49}" type="datetimeFigureOut">
               <a:rPr lang="en-US" smtClean="0"/>
-              <a:t>10/18/18</a:t>
+              <a:t>10/25/18</a:t>
             </a:fld>
             <a:endParaRPr lang="en-US"/>
           </a:p>
@@ -1000,7 +1000,7 @@
           <a:p>
             <a:fld id="{78C97017-6FC3-485B-9764-EAC9E56C1D49}" type="datetimeFigureOut">
               <a:rPr lang="en-US" smtClean="0"/>
-              <a:t>10/18/18</a:t>
+              <a:t>10/25/18</a:t>
             </a:fld>
             <a:endParaRPr lang="en-US"/>
           </a:p>
@@ -1168,7 +1168,7 @@
           <a:p>
             <a:fld id="{78C97017-6FC3-485B-9764-EAC9E56C1D49}" type="datetimeFigureOut">
               <a:rPr lang="en-US" smtClean="0"/>
-              <a:t>10/18/18</a:t>
+              <a:t>10/25/18</a:t>
             </a:fld>
             <a:endParaRPr lang="en-US"/>
           </a:p>
@@ -1413,7 +1413,7 @@
           <a:p>
             <a:fld id="{78C97017-6FC3-485B-9764-EAC9E56C1D49}" type="datetimeFigureOut">
               <a:rPr lang="en-US" smtClean="0"/>
-              <a:t>10/18/18</a:t>
+              <a:t>10/25/18</a:t>
             </a:fld>
             <a:endParaRPr lang="en-US"/>
           </a:p>
@@ -1698,7 +1698,7 @@
           <a:p>
             <a:fld id="{78C97017-6FC3-485B-9764-EAC9E56C1D49}" type="datetimeFigureOut">
               <a:rPr lang="en-US" smtClean="0"/>
-              <a:t>10/18/18</a:t>
+              <a:t>10/25/18</a:t>
             </a:fld>
             <a:endParaRPr lang="en-US"/>
           </a:p>
@@ -2117,7 +2117,7 @@
           <a:p>
             <a:fld id="{78C97017-6FC3-485B-9764-EAC9E56C1D49}" type="datetimeFigureOut">
               <a:rPr lang="en-US" smtClean="0"/>
-              <a:t>10/18/18</a:t>
+              <a:t>10/25/18</a:t>
             </a:fld>
             <a:endParaRPr lang="en-US"/>
           </a:p>
@@ -2234,7 +2234,7 @@
           <a:p>
             <a:fld id="{78C97017-6FC3-485B-9764-EAC9E56C1D49}" type="datetimeFigureOut">
               <a:rPr lang="en-US" smtClean="0"/>
-              <a:t>10/18/18</a:t>
+              <a:t>10/25/18</a:t>
             </a:fld>
             <a:endParaRPr lang="en-US"/>
           </a:p>
@@ -2329,7 +2329,7 @@
           <a:p>
             <a:fld id="{78C97017-6FC3-485B-9764-EAC9E56C1D49}" type="datetimeFigureOut">
               <a:rPr lang="en-US" smtClean="0"/>
-              <a:t>10/18/18</a:t>
+              <a:t>10/25/18</a:t>
             </a:fld>
             <a:endParaRPr lang="en-US"/>
           </a:p>
@@ -2604,7 +2604,7 @@
           <a:p>
             <a:fld id="{78C97017-6FC3-485B-9764-EAC9E56C1D49}" type="datetimeFigureOut">
               <a:rPr lang="en-US" smtClean="0"/>
-              <a:t>10/18/18</a:t>
+              <a:t>10/25/18</a:t>
             </a:fld>
             <a:endParaRPr lang="en-US"/>
           </a:p>
@@ -2856,7 +2856,7 @@
           <a:p>
             <a:fld id="{78C97017-6FC3-485B-9764-EAC9E56C1D49}" type="datetimeFigureOut">
               <a:rPr lang="en-US" smtClean="0"/>
-              <a:t>10/18/18</a:t>
+              <a:t>10/25/18</a:t>
             </a:fld>
             <a:endParaRPr lang="en-US"/>
           </a:p>
@@ -3067,7 +3067,7 @@
           <a:p>
             <a:fld id="{78C97017-6FC3-485B-9764-EAC9E56C1D49}" type="datetimeFigureOut">
               <a:rPr lang="en-US" smtClean="0"/>
-              <a:t>10/18/18</a:t>
+              <a:t>10/25/18</a:t>
             </a:fld>
             <a:endParaRPr lang="en-US"/>
           </a:p>
@@ -3456,8 +3456,8 @@
         </p:nvSpPr>
         <p:spPr>
           <a:xfrm>
-            <a:off x="3325276" y="382162"/>
-            <a:ext cx="5209124" cy="6094838"/>
+            <a:off x="3325275" y="382162"/>
+            <a:ext cx="5782761" cy="6094838"/>
           </a:xfrm>
           <a:prstGeom prst="roundRect">
             <a:avLst>
@@ -4667,6 +4667,586 @@
             <a:prstDash val="sysDash"/>
             <a:headEnd type="arrow" w="med" len="med"/>
             <a:tailEnd type="none" w="med" len="med"/>
+          </a:ln>
+        </p:spPr>
+        <p:style>
+          <a:lnRef idx="1">
+            <a:schemeClr val="accent1"/>
+          </a:lnRef>
+          <a:fillRef idx="0">
+            <a:schemeClr val="accent1"/>
+          </a:fillRef>
+          <a:effectRef idx="0">
+            <a:schemeClr val="accent1"/>
+          </a:effectRef>
+          <a:fontRef idx="minor">
+            <a:schemeClr val="tx1"/>
+          </a:fontRef>
+        </p:style>
+      </p:cxnSp>
+      <p:sp>
+        <p:nvSpPr>
+          <p:cNvPr id="27" name="Rectangle 26">
+            <a:extLst>
+              <a:ext uri="{FF2B5EF4-FFF2-40B4-BE49-F238E27FC236}">
+                <a16:creationId xmlns:a16="http://schemas.microsoft.com/office/drawing/2014/main" id="{6A56406A-002F-D24A-B161-5186DC236411}"/>
+              </a:ext>
+            </a:extLst>
+          </p:cNvPr>
+          <p:cNvSpPr/>
+          <p:nvPr/>
+        </p:nvSpPr>
+        <p:spPr>
+          <a:xfrm>
+            <a:off x="3886200" y="1534009"/>
+            <a:ext cx="184799" cy="523391"/>
+          </a:xfrm>
+          <a:prstGeom prst="rect">
+            <a:avLst/>
+          </a:prstGeom>
+          <a:solidFill>
+            <a:schemeClr val="accent4"/>
+          </a:solidFill>
+          <a:ln>
+            <a:noFill/>
+          </a:ln>
+        </p:spPr>
+        <p:style>
+          <a:lnRef idx="0">
+            <a:scrgbClr r="0" g="0" b="0"/>
+          </a:lnRef>
+          <a:fillRef idx="0">
+            <a:scrgbClr r="0" g="0" b="0"/>
+          </a:fillRef>
+          <a:effectRef idx="0">
+            <a:scrgbClr r="0" g="0" b="0"/>
+          </a:effectRef>
+          <a:fontRef idx="minor">
+            <a:schemeClr val="lt1"/>
+          </a:fontRef>
+        </p:style>
+        <p:txBody>
+          <a:bodyPr rtlCol="0" anchor="ctr"/>
+          <a:lstStyle/>
+          <a:p>
+            <a:pPr algn="ctr"/>
+            <a:endParaRPr lang="en-SG" sz="1400">
+              <a:solidFill>
+                <a:schemeClr val="dk1"/>
+              </a:solidFill>
+            </a:endParaRPr>
+          </a:p>
+        </p:txBody>
+      </p:sp>
+      <p:cxnSp>
+        <p:nvCxnSpPr>
+          <p:cNvPr id="28" name="Curved Connector 27">
+            <a:extLst>
+              <a:ext uri="{FF2B5EF4-FFF2-40B4-BE49-F238E27FC236}">
+                <a16:creationId xmlns:a16="http://schemas.microsoft.com/office/drawing/2014/main" id="{A2929ACB-F6DC-AF49-89BE-2D617E2F5AD9}"/>
+              </a:ext>
+            </a:extLst>
+          </p:cNvPr>
+          <p:cNvCxnSpPr/>
+          <p:nvPr/>
+        </p:nvCxnSpPr>
+        <p:spPr>
+          <a:xfrm rot="16200000" flipH="1">
+            <a:off x="3908622" y="1451062"/>
+            <a:ext cx="156923" cy="76200"/>
+          </a:xfrm>
+          <a:prstGeom prst="curvedConnector4">
+            <a:avLst>
+              <a:gd name="adj1" fmla="val -145677"/>
+              <a:gd name="adj2" fmla="val 400000"/>
+            </a:avLst>
+          </a:prstGeom>
+          <a:ln>
+            <a:solidFill>
+              <a:srgbClr val="7030A0"/>
+            </a:solidFill>
+            <a:tailEnd type="triangle"/>
+          </a:ln>
+        </p:spPr>
+        <p:style>
+          <a:lnRef idx="1">
+            <a:schemeClr val="accent1"/>
+          </a:lnRef>
+          <a:fillRef idx="0">
+            <a:schemeClr val="accent1"/>
+          </a:fillRef>
+          <a:effectRef idx="0">
+            <a:schemeClr val="accent1"/>
+          </a:effectRef>
+          <a:fontRef idx="minor">
+            <a:schemeClr val="tx1"/>
+          </a:fontRef>
+        </p:style>
+      </p:cxnSp>
+      <p:cxnSp>
+        <p:nvCxnSpPr>
+          <p:cNvPr id="35" name="Curved Connector 34">
+            <a:extLst>
+              <a:ext uri="{FF2B5EF4-FFF2-40B4-BE49-F238E27FC236}">
+                <a16:creationId xmlns:a16="http://schemas.microsoft.com/office/drawing/2014/main" id="{2E1A6A1B-7A4D-5C44-87CD-525BB18D0EE0}"/>
+              </a:ext>
+            </a:extLst>
+          </p:cNvPr>
+          <p:cNvCxnSpPr>
+            <a:cxnSpLocks/>
+          </p:cNvCxnSpPr>
+          <p:nvPr/>
+        </p:nvCxnSpPr>
+        <p:spPr>
+          <a:xfrm rot="5400000">
+            <a:off x="3915321" y="2050355"/>
+            <a:ext cx="143524" cy="135732"/>
+          </a:xfrm>
+          <a:prstGeom prst="curvedConnector3">
+            <a:avLst>
+              <a:gd name="adj1" fmla="val 251616"/>
+            </a:avLst>
+          </a:prstGeom>
+          <a:ln>
+            <a:solidFill>
+              <a:srgbClr val="7030A0"/>
+            </a:solidFill>
+            <a:prstDash val="dash"/>
+            <a:tailEnd type="triangle"/>
+          </a:ln>
+        </p:spPr>
+        <p:style>
+          <a:lnRef idx="1">
+            <a:schemeClr val="accent1"/>
+          </a:lnRef>
+          <a:fillRef idx="0">
+            <a:schemeClr val="accent1"/>
+          </a:fillRef>
+          <a:effectRef idx="0">
+            <a:schemeClr val="accent1"/>
+          </a:effectRef>
+          <a:fontRef idx="minor">
+            <a:schemeClr val="tx1"/>
+          </a:fontRef>
+        </p:style>
+      </p:cxnSp>
+      <p:sp>
+        <p:nvSpPr>
+          <p:cNvPr id="39" name="TextBox 38">
+            <a:extLst>
+              <a:ext uri="{FF2B5EF4-FFF2-40B4-BE49-F238E27FC236}">
+                <a16:creationId xmlns:a16="http://schemas.microsoft.com/office/drawing/2014/main" id="{DAE8FE41-CAD0-5E49-B99C-7A864F8156E1}"/>
+              </a:ext>
+            </a:extLst>
+          </p:cNvPr>
+          <p:cNvSpPr txBox="1"/>
+          <p:nvPr/>
+        </p:nvSpPr>
+        <p:spPr>
+          <a:xfrm>
+            <a:off x="4253756" y="1059936"/>
+            <a:ext cx="1488037" cy="215444"/>
+          </a:xfrm>
+          <a:prstGeom prst="rect">
+            <a:avLst/>
+          </a:prstGeom>
+          <a:noFill/>
+        </p:spPr>
+        <p:txBody>
+          <a:bodyPr wrap="square" lIns="0" tIns="0" rIns="0" bIns="0" rtlCol="0">
+            <a:spAutoFit/>
+          </a:bodyPr>
+          <a:lstStyle/>
+          <a:p>
+            <a:r>
+              <a:rPr lang="en-US" sz="1400" dirty="0" err="1">
+                <a:solidFill>
+                  <a:srgbClr val="7030A0"/>
+                </a:solidFill>
+              </a:rPr>
+              <a:t>doCensoring</a:t>
+            </a:r>
+            <a:r>
+              <a:rPr lang="en-US" sz="1400" dirty="0">
+                <a:solidFill>
+                  <a:srgbClr val="7030A0"/>
+                </a:solidFill>
+              </a:rPr>
+              <a:t>(length)</a:t>
+            </a:r>
+          </a:p>
+        </p:txBody>
+      </p:sp>
+      <p:sp>
+        <p:nvSpPr>
+          <p:cNvPr id="41" name="Rectangle 40">
+            <a:extLst>
+              <a:ext uri="{FF2B5EF4-FFF2-40B4-BE49-F238E27FC236}">
+                <a16:creationId xmlns:a16="http://schemas.microsoft.com/office/drawing/2014/main" id="{C1E1230D-575A-374C-8C39-BE358A8F7979}"/>
+              </a:ext>
+            </a:extLst>
+          </p:cNvPr>
+          <p:cNvSpPr/>
+          <p:nvPr/>
+        </p:nvSpPr>
+        <p:spPr>
+          <a:xfrm>
+            <a:off x="5799981" y="2929422"/>
+            <a:ext cx="184799" cy="523391"/>
+          </a:xfrm>
+          <a:prstGeom prst="rect">
+            <a:avLst/>
+          </a:prstGeom>
+          <a:solidFill>
+            <a:schemeClr val="accent4"/>
+          </a:solidFill>
+          <a:ln>
+            <a:noFill/>
+          </a:ln>
+        </p:spPr>
+        <p:style>
+          <a:lnRef idx="0">
+            <a:scrgbClr r="0" g="0" b="0"/>
+          </a:lnRef>
+          <a:fillRef idx="0">
+            <a:scrgbClr r="0" g="0" b="0"/>
+          </a:fillRef>
+          <a:effectRef idx="0">
+            <a:scrgbClr r="0" g="0" b="0"/>
+          </a:effectRef>
+          <a:fontRef idx="minor">
+            <a:schemeClr val="lt1"/>
+          </a:fontRef>
+        </p:style>
+        <p:txBody>
+          <a:bodyPr rtlCol="0" anchor="ctr"/>
+          <a:lstStyle/>
+          <a:p>
+            <a:pPr algn="ctr"/>
+            <a:endParaRPr lang="en-SG" sz="1400">
+              <a:solidFill>
+                <a:schemeClr val="dk1"/>
+              </a:solidFill>
+            </a:endParaRPr>
+          </a:p>
+        </p:txBody>
+      </p:sp>
+      <p:cxnSp>
+        <p:nvCxnSpPr>
+          <p:cNvPr id="42" name="Curved Connector 41">
+            <a:extLst>
+              <a:ext uri="{FF2B5EF4-FFF2-40B4-BE49-F238E27FC236}">
+                <a16:creationId xmlns:a16="http://schemas.microsoft.com/office/drawing/2014/main" id="{76339A85-CD6A-4A4E-8092-B7EEF5358CA8}"/>
+              </a:ext>
+            </a:extLst>
+          </p:cNvPr>
+          <p:cNvCxnSpPr/>
+          <p:nvPr/>
+        </p:nvCxnSpPr>
+        <p:spPr>
+          <a:xfrm rot="16200000" flipH="1">
+            <a:off x="5822403" y="2846475"/>
+            <a:ext cx="156923" cy="76200"/>
+          </a:xfrm>
+          <a:prstGeom prst="curvedConnector4">
+            <a:avLst>
+              <a:gd name="adj1" fmla="val -145677"/>
+              <a:gd name="adj2" fmla="val 400000"/>
+            </a:avLst>
+          </a:prstGeom>
+          <a:ln>
+            <a:solidFill>
+              <a:srgbClr val="7030A0"/>
+            </a:solidFill>
+            <a:tailEnd type="triangle"/>
+          </a:ln>
+        </p:spPr>
+        <p:style>
+          <a:lnRef idx="1">
+            <a:schemeClr val="accent1"/>
+          </a:lnRef>
+          <a:fillRef idx="0">
+            <a:schemeClr val="accent1"/>
+          </a:fillRef>
+          <a:effectRef idx="0">
+            <a:schemeClr val="accent1"/>
+          </a:effectRef>
+          <a:fontRef idx="minor">
+            <a:schemeClr val="tx1"/>
+          </a:fontRef>
+        </p:style>
+      </p:cxnSp>
+      <p:cxnSp>
+        <p:nvCxnSpPr>
+          <p:cNvPr id="43" name="Curved Connector 42">
+            <a:extLst>
+              <a:ext uri="{FF2B5EF4-FFF2-40B4-BE49-F238E27FC236}">
+                <a16:creationId xmlns:a16="http://schemas.microsoft.com/office/drawing/2014/main" id="{4C748A24-8985-574F-A0AA-32AA48373A64}"/>
+              </a:ext>
+            </a:extLst>
+          </p:cNvPr>
+          <p:cNvCxnSpPr>
+            <a:cxnSpLocks/>
+          </p:cNvCxnSpPr>
+          <p:nvPr/>
+        </p:nvCxnSpPr>
+        <p:spPr>
+          <a:xfrm rot="5400000">
+            <a:off x="5853833" y="3459023"/>
+            <a:ext cx="132048" cy="97746"/>
+          </a:xfrm>
+          <a:prstGeom prst="curvedConnector3">
+            <a:avLst>
+              <a:gd name="adj1" fmla="val 321731"/>
+            </a:avLst>
+          </a:prstGeom>
+          <a:ln>
+            <a:solidFill>
+              <a:srgbClr val="7030A0"/>
+            </a:solidFill>
+            <a:prstDash val="dash"/>
+            <a:tailEnd type="triangle"/>
+          </a:ln>
+        </p:spPr>
+        <p:style>
+          <a:lnRef idx="1">
+            <a:schemeClr val="accent1"/>
+          </a:lnRef>
+          <a:fillRef idx="0">
+            <a:schemeClr val="accent1"/>
+          </a:fillRef>
+          <a:effectRef idx="0">
+            <a:schemeClr val="accent1"/>
+          </a:effectRef>
+          <a:fontRef idx="minor">
+            <a:schemeClr val="tx1"/>
+          </a:fontRef>
+        </p:style>
+      </p:cxnSp>
+      <p:sp>
+        <p:nvSpPr>
+          <p:cNvPr id="44" name="TextBox 43">
+            <a:extLst>
+              <a:ext uri="{FF2B5EF4-FFF2-40B4-BE49-F238E27FC236}">
+                <a16:creationId xmlns:a16="http://schemas.microsoft.com/office/drawing/2014/main" id="{CA4D5E19-66E5-F644-991B-D284E2C468EE}"/>
+              </a:ext>
+            </a:extLst>
+          </p:cNvPr>
+          <p:cNvSpPr txBox="1"/>
+          <p:nvPr/>
+        </p:nvSpPr>
+        <p:spPr>
+          <a:xfrm>
+            <a:off x="6167537" y="2455349"/>
+            <a:ext cx="1488037" cy="215444"/>
+          </a:xfrm>
+          <a:prstGeom prst="rect">
+            <a:avLst/>
+          </a:prstGeom>
+          <a:noFill/>
+        </p:spPr>
+        <p:txBody>
+          <a:bodyPr wrap="square" lIns="0" tIns="0" rIns="0" bIns="0" rtlCol="0">
+            <a:spAutoFit/>
+          </a:bodyPr>
+          <a:lstStyle/>
+          <a:p>
+            <a:r>
+              <a:rPr lang="en-US" sz="1400" dirty="0" err="1">
+                <a:solidFill>
+                  <a:srgbClr val="7030A0"/>
+                </a:solidFill>
+              </a:rPr>
+              <a:t>doCensoring</a:t>
+            </a:r>
+            <a:r>
+              <a:rPr lang="en-US" sz="1400" dirty="0">
+                <a:solidFill>
+                  <a:srgbClr val="7030A0"/>
+                </a:solidFill>
+              </a:rPr>
+              <a:t>(length)</a:t>
+            </a:r>
+          </a:p>
+        </p:txBody>
+      </p:sp>
+      <p:sp>
+        <p:nvSpPr>
+          <p:cNvPr id="45" name="Rectangle 44">
+            <a:extLst>
+              <a:ext uri="{FF2B5EF4-FFF2-40B4-BE49-F238E27FC236}">
+                <a16:creationId xmlns:a16="http://schemas.microsoft.com/office/drawing/2014/main" id="{D65C46CA-33CB-3647-A135-4DFA78810826}"/>
+              </a:ext>
+            </a:extLst>
+          </p:cNvPr>
+          <p:cNvSpPr/>
+          <p:nvPr/>
+        </p:nvSpPr>
+        <p:spPr>
+          <a:xfrm>
+            <a:off x="7663801" y="4353409"/>
+            <a:ext cx="184799" cy="523391"/>
+          </a:xfrm>
+          <a:prstGeom prst="rect">
+            <a:avLst/>
+          </a:prstGeom>
+          <a:solidFill>
+            <a:schemeClr val="accent4"/>
+          </a:solidFill>
+          <a:ln>
+            <a:noFill/>
+          </a:ln>
+        </p:spPr>
+        <p:style>
+          <a:lnRef idx="0">
+            <a:scrgbClr r="0" g="0" b="0"/>
+          </a:lnRef>
+          <a:fillRef idx="0">
+            <a:scrgbClr r="0" g="0" b="0"/>
+          </a:fillRef>
+          <a:effectRef idx="0">
+            <a:scrgbClr r="0" g="0" b="0"/>
+          </a:effectRef>
+          <a:fontRef idx="minor">
+            <a:schemeClr val="lt1"/>
+          </a:fontRef>
+        </p:style>
+        <p:txBody>
+          <a:bodyPr rtlCol="0" anchor="ctr"/>
+          <a:lstStyle/>
+          <a:p>
+            <a:pPr algn="ctr"/>
+            <a:endParaRPr lang="en-SG" sz="1400">
+              <a:solidFill>
+                <a:schemeClr val="dk1"/>
+              </a:solidFill>
+            </a:endParaRPr>
+          </a:p>
+        </p:txBody>
+      </p:sp>
+      <p:cxnSp>
+        <p:nvCxnSpPr>
+          <p:cNvPr id="46" name="Curved Connector 45">
+            <a:extLst>
+              <a:ext uri="{FF2B5EF4-FFF2-40B4-BE49-F238E27FC236}">
+                <a16:creationId xmlns:a16="http://schemas.microsoft.com/office/drawing/2014/main" id="{FC00D4C0-37C3-574B-ACCB-B9099FF34F18}"/>
+              </a:ext>
+            </a:extLst>
+          </p:cNvPr>
+          <p:cNvCxnSpPr>
+            <a:cxnSpLocks/>
+          </p:cNvCxnSpPr>
+          <p:nvPr/>
+        </p:nvCxnSpPr>
+        <p:spPr>
+          <a:xfrm>
+            <a:off x="7672528" y="4194291"/>
+            <a:ext cx="176072" cy="149108"/>
+          </a:xfrm>
+          <a:prstGeom prst="curvedConnector3">
+            <a:avLst>
+              <a:gd name="adj1" fmla="val 207772"/>
+            </a:avLst>
+          </a:prstGeom>
+          <a:ln>
+            <a:solidFill>
+              <a:srgbClr val="7030A0"/>
+            </a:solidFill>
+            <a:tailEnd type="triangle"/>
+          </a:ln>
+        </p:spPr>
+        <p:style>
+          <a:lnRef idx="1">
+            <a:schemeClr val="accent1"/>
+          </a:lnRef>
+          <a:fillRef idx="0">
+            <a:schemeClr val="accent1"/>
+          </a:fillRef>
+          <a:effectRef idx="0">
+            <a:schemeClr val="accent1"/>
+          </a:effectRef>
+          <a:fontRef idx="minor">
+            <a:schemeClr val="tx1"/>
+          </a:fontRef>
+        </p:style>
+      </p:cxnSp>
+      <p:sp>
+        <p:nvSpPr>
+          <p:cNvPr id="48" name="TextBox 47">
+            <a:extLst>
+              <a:ext uri="{FF2B5EF4-FFF2-40B4-BE49-F238E27FC236}">
+                <a16:creationId xmlns:a16="http://schemas.microsoft.com/office/drawing/2014/main" id="{662A1580-A85F-0146-88B4-419E97645B55}"/>
+              </a:ext>
+            </a:extLst>
+          </p:cNvPr>
+          <p:cNvSpPr txBox="1"/>
+          <p:nvPr/>
+        </p:nvSpPr>
+        <p:spPr>
+          <a:xfrm>
+            <a:off x="7620000" y="3975556"/>
+            <a:ext cx="1488037" cy="215444"/>
+          </a:xfrm>
+          <a:prstGeom prst="rect">
+            <a:avLst/>
+          </a:prstGeom>
+          <a:noFill/>
+        </p:spPr>
+        <p:txBody>
+          <a:bodyPr wrap="square" lIns="0" tIns="0" rIns="0" bIns="0" rtlCol="0">
+            <a:spAutoFit/>
+          </a:bodyPr>
+          <a:lstStyle/>
+          <a:p>
+            <a:r>
+              <a:rPr lang="en-US" sz="1400" dirty="0" err="1">
+                <a:solidFill>
+                  <a:srgbClr val="7030A0"/>
+                </a:solidFill>
+              </a:rPr>
+              <a:t>doCensoring</a:t>
+            </a:r>
+            <a:r>
+              <a:rPr lang="en-US" sz="1400" dirty="0">
+                <a:solidFill>
+                  <a:srgbClr val="7030A0"/>
+                </a:solidFill>
+              </a:rPr>
+              <a:t>(length)</a:t>
+            </a:r>
+          </a:p>
+        </p:txBody>
+      </p:sp>
+      <p:cxnSp>
+        <p:nvCxnSpPr>
+          <p:cNvPr id="56" name="Curved Connector 55">
+            <a:extLst>
+              <a:ext uri="{FF2B5EF4-FFF2-40B4-BE49-F238E27FC236}">
+                <a16:creationId xmlns:a16="http://schemas.microsoft.com/office/drawing/2014/main" id="{F1FE2B54-056B-A043-9871-4AAF429EE98C}"/>
+              </a:ext>
+            </a:extLst>
+          </p:cNvPr>
+          <p:cNvCxnSpPr>
+            <a:cxnSpLocks/>
+          </p:cNvCxnSpPr>
+          <p:nvPr/>
+        </p:nvCxnSpPr>
+        <p:spPr>
+          <a:xfrm rot="10800000" flipV="1">
+            <a:off x="7685716" y="4841451"/>
+            <a:ext cx="151921" cy="123869"/>
+          </a:xfrm>
+          <a:prstGeom prst="curvedConnector3">
+            <a:avLst>
+              <a:gd name="adj1" fmla="val -140472"/>
+            </a:avLst>
+          </a:prstGeom>
+          <a:ln>
+            <a:solidFill>
+              <a:srgbClr val="7030A0"/>
+            </a:solidFill>
+            <a:prstDash val="dash"/>
+            <a:tailEnd type="triangle"/>
           </a:ln>
         </p:spPr>
         <p:style>

</xml_diff>